<commit_message>
Added chapter multiple pop
</commit_message>
<xml_diff>
--- a/Figures/Présentation1.pptx
+++ b/Figures/Présentation1.pptx
@@ -8,6 +8,14 @@
     <p:sldId id="256" r:id="rId5"/>
     <p:sldId id="257" r:id="rId6"/>
     <p:sldId id="258" r:id="rId7"/>
+    <p:sldId id="259" r:id="rId8"/>
+    <p:sldId id="260" r:id="rId9"/>
+    <p:sldId id="261" r:id="rId10"/>
+    <p:sldId id="262" r:id="rId11"/>
+    <p:sldId id="263" r:id="rId12"/>
+    <p:sldId id="264" r:id="rId13"/>
+    <p:sldId id="265" r:id="rId14"/>
+    <p:sldId id="266" r:id="rId15"/>
   </p:sldIdLst>
   <p:sldSz cx="12192000" cy="6858000"/>
   <p:notesSz cx="6858000" cy="9144000"/>
@@ -106,7 +114,335 @@
       </a:defRPr>
     </a:lvl9pPr>
   </p:defaultTextStyle>
+  <p:extLst>
+    <p:ext uri="{EFAFB233-063F-42B5-8137-9DF3F51BA10A}">
+      <p15:sldGuideLst xmlns:p15="http://schemas.microsoft.com/office/powerpoint/2012/main"/>
+    </p:ext>
+  </p:extLst>
 </p:presentation>
+</file>
+
+<file path=ppt/changesInfos/changesInfo1.xml><?xml version="1.0" encoding="utf-8"?>
+<pc:chgInfo xmlns:a="http://schemas.openxmlformats.org/drawingml/2006/main" xmlns:r="http://schemas.openxmlformats.org/officeDocument/2006/relationships" xmlns:ac="http://schemas.microsoft.com/office/drawing/2013/main/command" xmlns:pc="http://schemas.microsoft.com/office/powerpoint/2013/main/command">
+  <pc:docChgLst>
+    <pc:chgData name="Simon Dufour" userId="38428de1-9cbc-422b-8b16-f4b0dc7c0437" providerId="ADAL" clId="{45AC5843-6491-4A37-8D18-05C67A4D8CE1}"/>
+    <pc:docChg chg="undo custSel addSld delSld modSld">
+      <pc:chgData name="Simon Dufour" userId="38428de1-9cbc-422b-8b16-f4b0dc7c0437" providerId="ADAL" clId="{45AC5843-6491-4A37-8D18-05C67A4D8CE1}" dt="2022-05-20T18:25:14.792" v="64" actId="208"/>
+      <pc:docMkLst>
+        <pc:docMk/>
+      </pc:docMkLst>
+      <pc:sldChg chg="add del">
+        <pc:chgData name="Simon Dufour" userId="38428de1-9cbc-422b-8b16-f4b0dc7c0437" providerId="ADAL" clId="{45AC5843-6491-4A37-8D18-05C67A4D8CE1}" dt="2022-05-04T17:51:26.044" v="7" actId="2696"/>
+        <pc:sldMkLst>
+          <pc:docMk/>
+          <pc:sldMk cId="924991852" sldId="256"/>
+        </pc:sldMkLst>
+      </pc:sldChg>
+      <pc:sldChg chg="addSp delSp modSp add del">
+        <pc:chgData name="Simon Dufour" userId="38428de1-9cbc-422b-8b16-f4b0dc7c0437" providerId="ADAL" clId="{45AC5843-6491-4A37-8D18-05C67A4D8CE1}" dt="2022-05-20T13:30:40.810" v="41" actId="732"/>
+        <pc:sldMkLst>
+          <pc:docMk/>
+          <pc:sldMk cId="1346737966" sldId="257"/>
+        </pc:sldMkLst>
+        <pc:picChg chg="add mod modCrop">
+          <ac:chgData name="Simon Dufour" userId="38428de1-9cbc-422b-8b16-f4b0dc7c0437" providerId="ADAL" clId="{45AC5843-6491-4A37-8D18-05C67A4D8CE1}" dt="2022-05-20T13:30:40.810" v="41" actId="732"/>
+          <ac:picMkLst>
+            <pc:docMk/>
+            <pc:sldMk cId="1346737966" sldId="257"/>
+            <ac:picMk id="2" creationId="{48DD7EDF-5BAC-4AD6-84F9-309E8EF795CA}"/>
+          </ac:picMkLst>
+        </pc:picChg>
+        <pc:picChg chg="del">
+          <ac:chgData name="Simon Dufour" userId="38428de1-9cbc-422b-8b16-f4b0dc7c0437" providerId="ADAL" clId="{45AC5843-6491-4A37-8D18-05C67A4D8CE1}" dt="2022-05-20T13:30:28.321" v="38" actId="478"/>
+          <ac:picMkLst>
+            <pc:docMk/>
+            <pc:sldMk cId="1346737966" sldId="257"/>
+            <ac:picMk id="4" creationId="{67F9DEDF-8CAF-4E04-AB9E-A702C57A194C}"/>
+          </ac:picMkLst>
+        </pc:picChg>
+      </pc:sldChg>
+      <pc:sldChg chg="add del">
+        <pc:chgData name="Simon Dufour" userId="38428de1-9cbc-422b-8b16-f4b0dc7c0437" providerId="ADAL" clId="{45AC5843-6491-4A37-8D18-05C67A4D8CE1}" dt="2022-05-04T17:51:26.030" v="5" actId="2696"/>
+        <pc:sldMkLst>
+          <pc:docMk/>
+          <pc:sldMk cId="2973135706" sldId="258"/>
+        </pc:sldMkLst>
+      </pc:sldChg>
+      <pc:sldChg chg="addSp delSp modSp add del">
+        <pc:chgData name="Simon Dufour" userId="38428de1-9cbc-422b-8b16-f4b0dc7c0437" providerId="ADAL" clId="{45AC5843-6491-4A37-8D18-05C67A4D8CE1}" dt="2022-05-20T16:08:08.369" v="46" actId="208"/>
+        <pc:sldMkLst>
+          <pc:docMk/>
+          <pc:sldMk cId="22912130" sldId="259"/>
+        </pc:sldMkLst>
+        <pc:spChg chg="del">
+          <ac:chgData name="Simon Dufour" userId="38428de1-9cbc-422b-8b16-f4b0dc7c0437" providerId="ADAL" clId="{45AC5843-6491-4A37-8D18-05C67A4D8CE1}" dt="2022-05-04T17:51:31.782" v="9" actId="478"/>
+          <ac:spMkLst>
+            <pc:docMk/>
+            <pc:sldMk cId="22912130" sldId="259"/>
+            <ac:spMk id="2" creationId="{41EAC3C8-C291-48AB-9BDA-82E44DD1FF2D}"/>
+          </ac:spMkLst>
+        </pc:spChg>
+        <pc:spChg chg="del">
+          <ac:chgData name="Simon Dufour" userId="38428de1-9cbc-422b-8b16-f4b0dc7c0437" providerId="ADAL" clId="{45AC5843-6491-4A37-8D18-05C67A4D8CE1}" dt="2022-05-04T17:51:31.782" v="9" actId="478"/>
+          <ac:spMkLst>
+            <pc:docMk/>
+            <pc:sldMk cId="22912130" sldId="259"/>
+            <ac:spMk id="3" creationId="{F7DF6EC1-0F76-4BF4-B124-9CA4D95CB67A}"/>
+          </ac:spMkLst>
+        </pc:spChg>
+        <pc:picChg chg="add del">
+          <ac:chgData name="Simon Dufour" userId="38428de1-9cbc-422b-8b16-f4b0dc7c0437" providerId="ADAL" clId="{45AC5843-6491-4A37-8D18-05C67A4D8CE1}" dt="2022-05-04T20:19:05.059" v="13" actId="478"/>
+          <ac:picMkLst>
+            <pc:docMk/>
+            <pc:sldMk cId="22912130" sldId="259"/>
+            <ac:picMk id="2" creationId="{9C2B8E39-A5EF-4069-8585-702DFDFEA49D}"/>
+          </ac:picMkLst>
+        </pc:picChg>
+        <pc:picChg chg="add mod">
+          <ac:chgData name="Simon Dufour" userId="38428de1-9cbc-422b-8b16-f4b0dc7c0437" providerId="ADAL" clId="{45AC5843-6491-4A37-8D18-05C67A4D8CE1}" dt="2022-05-20T16:08:08.369" v="46" actId="208"/>
+          <ac:picMkLst>
+            <pc:docMk/>
+            <pc:sldMk cId="22912130" sldId="259"/>
+            <ac:picMk id="3" creationId="{42FADC67-AA9F-48E2-AF07-9F0A23D66A6F}"/>
+          </ac:picMkLst>
+        </pc:picChg>
+        <pc:picChg chg="add del">
+          <ac:chgData name="Simon Dufour" userId="38428de1-9cbc-422b-8b16-f4b0dc7c0437" providerId="ADAL" clId="{45AC5843-6491-4A37-8D18-05C67A4D8CE1}" dt="2022-05-04T19:48:08.241" v="11" actId="478"/>
+          <ac:picMkLst>
+            <pc:docMk/>
+            <pc:sldMk cId="22912130" sldId="259"/>
+            <ac:picMk id="4" creationId="{FD9C642D-3E07-489E-8572-A789B1CCD333}"/>
+          </ac:picMkLst>
+        </pc:picChg>
+      </pc:sldChg>
+      <pc:sldChg chg="addSp delSp modSp add">
+        <pc:chgData name="Simon Dufour" userId="38428de1-9cbc-422b-8b16-f4b0dc7c0437" providerId="ADAL" clId="{45AC5843-6491-4A37-8D18-05C67A4D8CE1}" dt="2022-05-20T16:08:42.779" v="50" actId="208"/>
+        <pc:sldMkLst>
+          <pc:docMk/>
+          <pc:sldMk cId="2247806275" sldId="260"/>
+        </pc:sldMkLst>
+        <pc:spChg chg="del">
+          <ac:chgData name="Simon Dufour" userId="38428de1-9cbc-422b-8b16-f4b0dc7c0437" providerId="ADAL" clId="{45AC5843-6491-4A37-8D18-05C67A4D8CE1}" dt="2022-05-04T20:58:54.557" v="16" actId="478"/>
+          <ac:spMkLst>
+            <pc:docMk/>
+            <pc:sldMk cId="2247806275" sldId="260"/>
+            <ac:spMk id="2" creationId="{AB7D3FB7-BCBF-426E-8BAE-6BE24964F4B3}"/>
+          </ac:spMkLst>
+        </pc:spChg>
+        <pc:spChg chg="del">
+          <ac:chgData name="Simon Dufour" userId="38428de1-9cbc-422b-8b16-f4b0dc7c0437" providerId="ADAL" clId="{45AC5843-6491-4A37-8D18-05C67A4D8CE1}" dt="2022-05-04T20:58:54.557" v="16" actId="478"/>
+          <ac:spMkLst>
+            <pc:docMk/>
+            <pc:sldMk cId="2247806275" sldId="260"/>
+            <ac:spMk id="3" creationId="{C6064252-AC99-4ED9-834E-6BD2237B68C8}"/>
+          </ac:spMkLst>
+        </pc:spChg>
+        <pc:picChg chg="add del">
+          <ac:chgData name="Simon Dufour" userId="38428de1-9cbc-422b-8b16-f4b0dc7c0437" providerId="ADAL" clId="{45AC5843-6491-4A37-8D18-05C67A4D8CE1}" dt="2022-05-20T16:08:34.127" v="48" actId="478"/>
+          <ac:picMkLst>
+            <pc:docMk/>
+            <pc:sldMk cId="2247806275" sldId="260"/>
+            <ac:picMk id="4" creationId="{9986D290-439B-4F4D-9883-7532AD5FF0C8}"/>
+          </ac:picMkLst>
+        </pc:picChg>
+        <pc:picChg chg="add mod">
+          <ac:chgData name="Simon Dufour" userId="38428de1-9cbc-422b-8b16-f4b0dc7c0437" providerId="ADAL" clId="{45AC5843-6491-4A37-8D18-05C67A4D8CE1}" dt="2022-05-20T16:08:42.779" v="50" actId="208"/>
+          <ac:picMkLst>
+            <pc:docMk/>
+            <pc:sldMk cId="2247806275" sldId="260"/>
+            <ac:picMk id="5" creationId="{08852E05-6A38-4E84-8333-D12A8AA75D48}"/>
+          </ac:picMkLst>
+        </pc:picChg>
+      </pc:sldChg>
+      <pc:sldChg chg="addSp delSp modSp add">
+        <pc:chgData name="Simon Dufour" userId="38428de1-9cbc-422b-8b16-f4b0dc7c0437" providerId="ADAL" clId="{45AC5843-6491-4A37-8D18-05C67A4D8CE1}" dt="2022-05-19T20:49:56.663" v="25" actId="208"/>
+        <pc:sldMkLst>
+          <pc:docMk/>
+          <pc:sldMk cId="3574589000" sldId="261"/>
+        </pc:sldMkLst>
+        <pc:spChg chg="del">
+          <ac:chgData name="Simon Dufour" userId="38428de1-9cbc-422b-8b16-f4b0dc7c0437" providerId="ADAL" clId="{45AC5843-6491-4A37-8D18-05C67A4D8CE1}" dt="2022-05-19T20:49:25.725" v="20" actId="478"/>
+          <ac:spMkLst>
+            <pc:docMk/>
+            <pc:sldMk cId="3574589000" sldId="261"/>
+            <ac:spMk id="2" creationId="{4289A87B-2535-4DF8-BD50-7BD9488EB5E6}"/>
+          </ac:spMkLst>
+        </pc:spChg>
+        <pc:spChg chg="del">
+          <ac:chgData name="Simon Dufour" userId="38428de1-9cbc-422b-8b16-f4b0dc7c0437" providerId="ADAL" clId="{45AC5843-6491-4A37-8D18-05C67A4D8CE1}" dt="2022-05-19T20:49:25.725" v="20" actId="478"/>
+          <ac:spMkLst>
+            <pc:docMk/>
+            <pc:sldMk cId="3574589000" sldId="261"/>
+            <ac:spMk id="3" creationId="{D10ED5FC-9CE2-492E-919D-B10293301EE0}"/>
+          </ac:spMkLst>
+        </pc:spChg>
+        <pc:picChg chg="add mod modCrop">
+          <ac:chgData name="Simon Dufour" userId="38428de1-9cbc-422b-8b16-f4b0dc7c0437" providerId="ADAL" clId="{45AC5843-6491-4A37-8D18-05C67A4D8CE1}" dt="2022-05-19T20:49:56.663" v="25" actId="208"/>
+          <ac:picMkLst>
+            <pc:docMk/>
+            <pc:sldMk cId="3574589000" sldId="261"/>
+            <ac:picMk id="4" creationId="{12BF5DBD-51A6-4449-AA67-5DBD4CBF64FD}"/>
+          </ac:picMkLst>
+        </pc:picChg>
+      </pc:sldChg>
+      <pc:sldChg chg="addSp delSp modSp add">
+        <pc:chgData name="Simon Dufour" userId="38428de1-9cbc-422b-8b16-f4b0dc7c0437" providerId="ADAL" clId="{45AC5843-6491-4A37-8D18-05C67A4D8CE1}" dt="2022-05-20T12:47:09.611" v="31" actId="208"/>
+        <pc:sldMkLst>
+          <pc:docMk/>
+          <pc:sldMk cId="3080628338" sldId="262"/>
+        </pc:sldMkLst>
+        <pc:spChg chg="del">
+          <ac:chgData name="Simon Dufour" userId="38428de1-9cbc-422b-8b16-f4b0dc7c0437" providerId="ADAL" clId="{45AC5843-6491-4A37-8D18-05C67A4D8CE1}" dt="2022-05-20T12:46:42.302" v="27" actId="478"/>
+          <ac:spMkLst>
+            <pc:docMk/>
+            <pc:sldMk cId="3080628338" sldId="262"/>
+            <ac:spMk id="2" creationId="{3B251428-A61C-40B1-AF0A-6891121DB40D}"/>
+          </ac:spMkLst>
+        </pc:spChg>
+        <pc:spChg chg="del">
+          <ac:chgData name="Simon Dufour" userId="38428de1-9cbc-422b-8b16-f4b0dc7c0437" providerId="ADAL" clId="{45AC5843-6491-4A37-8D18-05C67A4D8CE1}" dt="2022-05-20T12:46:42.302" v="27" actId="478"/>
+          <ac:spMkLst>
+            <pc:docMk/>
+            <pc:sldMk cId="3080628338" sldId="262"/>
+            <ac:spMk id="3" creationId="{11ABEB54-5B4D-4B5D-AFF3-136A36413121}"/>
+          </ac:spMkLst>
+        </pc:spChg>
+        <pc:picChg chg="add mod modCrop">
+          <ac:chgData name="Simon Dufour" userId="38428de1-9cbc-422b-8b16-f4b0dc7c0437" providerId="ADAL" clId="{45AC5843-6491-4A37-8D18-05C67A4D8CE1}" dt="2022-05-20T12:47:09.611" v="31" actId="208"/>
+          <ac:picMkLst>
+            <pc:docMk/>
+            <pc:sldMk cId="3080628338" sldId="262"/>
+            <ac:picMk id="4" creationId="{07DC9A66-0F2C-4848-A243-8A419A8C33EC}"/>
+          </ac:picMkLst>
+        </pc:picChg>
+      </pc:sldChg>
+      <pc:sldChg chg="addSp delSp modSp add">
+        <pc:chgData name="Simon Dufour" userId="38428de1-9cbc-422b-8b16-f4b0dc7c0437" providerId="ADAL" clId="{45AC5843-6491-4A37-8D18-05C67A4D8CE1}" dt="2022-05-20T12:56:46.598" v="37" actId="208"/>
+        <pc:sldMkLst>
+          <pc:docMk/>
+          <pc:sldMk cId="743851793" sldId="263"/>
+        </pc:sldMkLst>
+        <pc:spChg chg="del">
+          <ac:chgData name="Simon Dufour" userId="38428de1-9cbc-422b-8b16-f4b0dc7c0437" providerId="ADAL" clId="{45AC5843-6491-4A37-8D18-05C67A4D8CE1}" dt="2022-05-20T12:56:27.361" v="33" actId="478"/>
+          <ac:spMkLst>
+            <pc:docMk/>
+            <pc:sldMk cId="743851793" sldId="263"/>
+            <ac:spMk id="2" creationId="{BA16C32D-A0C6-421A-9A11-BC88061440F6}"/>
+          </ac:spMkLst>
+        </pc:spChg>
+        <pc:spChg chg="del">
+          <ac:chgData name="Simon Dufour" userId="38428de1-9cbc-422b-8b16-f4b0dc7c0437" providerId="ADAL" clId="{45AC5843-6491-4A37-8D18-05C67A4D8CE1}" dt="2022-05-20T12:56:27.361" v="33" actId="478"/>
+          <ac:spMkLst>
+            <pc:docMk/>
+            <pc:sldMk cId="743851793" sldId="263"/>
+            <ac:spMk id="3" creationId="{F049D135-DE44-4FFA-B9A4-9B90E60291BA}"/>
+          </ac:spMkLst>
+        </pc:spChg>
+        <pc:picChg chg="add mod modCrop">
+          <ac:chgData name="Simon Dufour" userId="38428de1-9cbc-422b-8b16-f4b0dc7c0437" providerId="ADAL" clId="{45AC5843-6491-4A37-8D18-05C67A4D8CE1}" dt="2022-05-20T12:56:46.598" v="37" actId="208"/>
+          <ac:picMkLst>
+            <pc:docMk/>
+            <pc:sldMk cId="743851793" sldId="263"/>
+            <ac:picMk id="4" creationId="{88045CE1-8B61-4451-9B60-1C8535C419B0}"/>
+          </ac:picMkLst>
+        </pc:picChg>
+      </pc:sldChg>
+      <pc:sldChg chg="addSp delSp modSp add">
+        <pc:chgData name="Simon Dufour" userId="38428de1-9cbc-422b-8b16-f4b0dc7c0437" providerId="ADAL" clId="{45AC5843-6491-4A37-8D18-05C67A4D8CE1}" dt="2022-05-20T17:03:44.120" v="56" actId="208"/>
+        <pc:sldMkLst>
+          <pc:docMk/>
+          <pc:sldMk cId="3805487723" sldId="264"/>
+        </pc:sldMkLst>
+        <pc:spChg chg="del">
+          <ac:chgData name="Simon Dufour" userId="38428de1-9cbc-422b-8b16-f4b0dc7c0437" providerId="ADAL" clId="{45AC5843-6491-4A37-8D18-05C67A4D8CE1}" dt="2022-05-20T16:07:15.425" v="43" actId="478"/>
+          <ac:spMkLst>
+            <pc:docMk/>
+            <pc:sldMk cId="3805487723" sldId="264"/>
+            <ac:spMk id="2" creationId="{F9BF6C63-D14A-4C7B-A632-AEE737C9EEEA}"/>
+          </ac:spMkLst>
+        </pc:spChg>
+        <pc:spChg chg="del">
+          <ac:chgData name="Simon Dufour" userId="38428de1-9cbc-422b-8b16-f4b0dc7c0437" providerId="ADAL" clId="{45AC5843-6491-4A37-8D18-05C67A4D8CE1}" dt="2022-05-20T16:07:15.425" v="43" actId="478"/>
+          <ac:spMkLst>
+            <pc:docMk/>
+            <pc:sldMk cId="3805487723" sldId="264"/>
+            <ac:spMk id="3" creationId="{ED59719C-9255-4110-B752-9719191313D8}"/>
+          </ac:spMkLst>
+        </pc:spChg>
+        <pc:picChg chg="add del mod">
+          <ac:chgData name="Simon Dufour" userId="38428de1-9cbc-422b-8b16-f4b0dc7c0437" providerId="ADAL" clId="{45AC5843-6491-4A37-8D18-05C67A4D8CE1}" dt="2022-05-20T16:14:35.698" v="51" actId="478"/>
+          <ac:picMkLst>
+            <pc:docMk/>
+            <pc:sldMk cId="3805487723" sldId="264"/>
+            <ac:picMk id="4" creationId="{E04E8878-A33E-4053-B91A-A21758C4C0AD}"/>
+          </ac:picMkLst>
+        </pc:picChg>
+        <pc:picChg chg="add del mod">
+          <ac:chgData name="Simon Dufour" userId="38428de1-9cbc-422b-8b16-f4b0dc7c0437" providerId="ADAL" clId="{45AC5843-6491-4A37-8D18-05C67A4D8CE1}" dt="2022-05-20T17:03:39.855" v="54" actId="478"/>
+          <ac:picMkLst>
+            <pc:docMk/>
+            <pc:sldMk cId="3805487723" sldId="264"/>
+            <ac:picMk id="5" creationId="{EA17AA3E-7CD2-43D3-85C3-1B3EFF64A284}"/>
+          </ac:picMkLst>
+        </pc:picChg>
+        <pc:picChg chg="add mod">
+          <ac:chgData name="Simon Dufour" userId="38428de1-9cbc-422b-8b16-f4b0dc7c0437" providerId="ADAL" clId="{45AC5843-6491-4A37-8D18-05C67A4D8CE1}" dt="2022-05-20T17:03:44.120" v="56" actId="208"/>
+          <ac:picMkLst>
+            <pc:docMk/>
+            <pc:sldMk cId="3805487723" sldId="264"/>
+            <ac:picMk id="6" creationId="{D70F5FF4-6B60-4FB1-95C3-65A7134868CA}"/>
+          </ac:picMkLst>
+        </pc:picChg>
+      </pc:sldChg>
+      <pc:sldChg chg="addSp delSp modSp add">
+        <pc:chgData name="Simon Dufour" userId="38428de1-9cbc-422b-8b16-f4b0dc7c0437" providerId="ADAL" clId="{45AC5843-6491-4A37-8D18-05C67A4D8CE1}" dt="2022-05-20T18:25:14.792" v="64" actId="208"/>
+        <pc:sldMkLst>
+          <pc:docMk/>
+          <pc:sldMk cId="1502691826" sldId="265"/>
+        </pc:sldMkLst>
+        <pc:spChg chg="del">
+          <ac:chgData name="Simon Dufour" userId="38428de1-9cbc-422b-8b16-f4b0dc7c0437" providerId="ADAL" clId="{45AC5843-6491-4A37-8D18-05C67A4D8CE1}" dt="2022-05-20T17:46:55.097" v="58" actId="478"/>
+          <ac:spMkLst>
+            <pc:docMk/>
+            <pc:sldMk cId="1502691826" sldId="265"/>
+            <ac:spMk id="2" creationId="{E32ABF20-A7A6-480A-80C6-B2E29CA92105}"/>
+          </ac:spMkLst>
+        </pc:spChg>
+        <pc:spChg chg="del">
+          <ac:chgData name="Simon Dufour" userId="38428de1-9cbc-422b-8b16-f4b0dc7c0437" providerId="ADAL" clId="{45AC5843-6491-4A37-8D18-05C67A4D8CE1}" dt="2022-05-20T17:46:55.097" v="58" actId="478"/>
+          <ac:spMkLst>
+            <pc:docMk/>
+            <pc:sldMk cId="1502691826" sldId="265"/>
+            <ac:spMk id="3" creationId="{7FE49677-81C1-415D-95C1-A5C1FC78CB02}"/>
+          </ac:spMkLst>
+        </pc:spChg>
+        <pc:picChg chg="add mod">
+          <ac:chgData name="Simon Dufour" userId="38428de1-9cbc-422b-8b16-f4b0dc7c0437" providerId="ADAL" clId="{45AC5843-6491-4A37-8D18-05C67A4D8CE1}" dt="2022-05-20T18:25:14.792" v="64" actId="208"/>
+          <ac:picMkLst>
+            <pc:docMk/>
+            <pc:sldMk cId="1502691826" sldId="265"/>
+            <ac:picMk id="2" creationId="{BE3DF13D-95A2-429B-AADC-137A20DA5FA2}"/>
+          </ac:picMkLst>
+        </pc:picChg>
+        <pc:picChg chg="add del mod">
+          <ac:chgData name="Simon Dufour" userId="38428de1-9cbc-422b-8b16-f4b0dc7c0437" providerId="ADAL" clId="{45AC5843-6491-4A37-8D18-05C67A4D8CE1}" dt="2022-05-20T18:25:07.652" v="62" actId="478"/>
+          <ac:picMkLst>
+            <pc:docMk/>
+            <pc:sldMk cId="1502691826" sldId="265"/>
+            <ac:picMk id="4" creationId="{D0DDAA73-ABDD-4F5D-8D81-0F54ACB75509}"/>
+          </ac:picMkLst>
+        </pc:picChg>
+      </pc:sldChg>
+      <pc:sldChg chg="add">
+        <pc:chgData name="Simon Dufour" userId="38428de1-9cbc-422b-8b16-f4b0dc7c0437" providerId="ADAL" clId="{45AC5843-6491-4A37-8D18-05C67A4D8CE1}" dt="2022-05-20T18:25:02.840" v="61"/>
+        <pc:sldMkLst>
+          <pc:docMk/>
+          <pc:sldMk cId="2501518047" sldId="266"/>
+        </pc:sldMkLst>
+      </pc:sldChg>
+    </pc:docChg>
+  </pc:docChgLst>
+</pc:chgInfo>
 </file>
 
 <file path=ppt/slideLayouts/slideLayout1.xml><?xml version="1.0" encoding="utf-8"?>
@@ -258,7 +594,7 @@
           <a:p>
             <a:fld id="{C396F5D7-5EA1-4438-8E1D-528E9996FEB9}" type="datetimeFigureOut">
               <a:rPr lang="fr-CA" smtClean="0"/>
-              <a:t>2022-04-26</a:t>
+              <a:t>2022-05-20</a:t>
             </a:fld>
             <a:endParaRPr lang="fr-CA"/>
           </a:p>
@@ -458,7 +794,7 @@
           <a:p>
             <a:fld id="{C396F5D7-5EA1-4438-8E1D-528E9996FEB9}" type="datetimeFigureOut">
               <a:rPr lang="fr-CA" smtClean="0"/>
-              <a:t>2022-04-26</a:t>
+              <a:t>2022-05-20</a:t>
             </a:fld>
             <a:endParaRPr lang="fr-CA"/>
           </a:p>
@@ -668,7 +1004,7 @@
           <a:p>
             <a:fld id="{C396F5D7-5EA1-4438-8E1D-528E9996FEB9}" type="datetimeFigureOut">
               <a:rPr lang="fr-CA" smtClean="0"/>
-              <a:t>2022-04-26</a:t>
+              <a:t>2022-05-20</a:t>
             </a:fld>
             <a:endParaRPr lang="fr-CA"/>
           </a:p>
@@ -868,7 +1204,7 @@
           <a:p>
             <a:fld id="{C396F5D7-5EA1-4438-8E1D-528E9996FEB9}" type="datetimeFigureOut">
               <a:rPr lang="fr-CA" smtClean="0"/>
-              <a:t>2022-04-26</a:t>
+              <a:t>2022-05-20</a:t>
             </a:fld>
             <a:endParaRPr lang="fr-CA"/>
           </a:p>
@@ -1144,7 +1480,7 @@
           <a:p>
             <a:fld id="{C396F5D7-5EA1-4438-8E1D-528E9996FEB9}" type="datetimeFigureOut">
               <a:rPr lang="fr-CA" smtClean="0"/>
-              <a:t>2022-04-26</a:t>
+              <a:t>2022-05-20</a:t>
             </a:fld>
             <a:endParaRPr lang="fr-CA"/>
           </a:p>
@@ -1412,7 +1748,7 @@
           <a:p>
             <a:fld id="{C396F5D7-5EA1-4438-8E1D-528E9996FEB9}" type="datetimeFigureOut">
               <a:rPr lang="fr-CA" smtClean="0"/>
-              <a:t>2022-04-26</a:t>
+              <a:t>2022-05-20</a:t>
             </a:fld>
             <a:endParaRPr lang="fr-CA"/>
           </a:p>
@@ -1827,7 +2163,7 @@
           <a:p>
             <a:fld id="{C396F5D7-5EA1-4438-8E1D-528E9996FEB9}" type="datetimeFigureOut">
               <a:rPr lang="fr-CA" smtClean="0"/>
-              <a:t>2022-04-26</a:t>
+              <a:t>2022-05-20</a:t>
             </a:fld>
             <a:endParaRPr lang="fr-CA"/>
           </a:p>
@@ -1969,7 +2305,7 @@
           <a:p>
             <a:fld id="{C396F5D7-5EA1-4438-8E1D-528E9996FEB9}" type="datetimeFigureOut">
               <a:rPr lang="fr-CA" smtClean="0"/>
-              <a:t>2022-04-26</a:t>
+              <a:t>2022-05-20</a:t>
             </a:fld>
             <a:endParaRPr lang="fr-CA"/>
           </a:p>
@@ -2082,7 +2418,7 @@
           <a:p>
             <a:fld id="{C396F5D7-5EA1-4438-8E1D-528E9996FEB9}" type="datetimeFigureOut">
               <a:rPr lang="fr-CA" smtClean="0"/>
-              <a:t>2022-04-26</a:t>
+              <a:t>2022-05-20</a:t>
             </a:fld>
             <a:endParaRPr lang="fr-CA"/>
           </a:p>
@@ -2395,7 +2731,7 @@
           <a:p>
             <a:fld id="{C396F5D7-5EA1-4438-8E1D-528E9996FEB9}" type="datetimeFigureOut">
               <a:rPr lang="fr-CA" smtClean="0"/>
-              <a:t>2022-04-26</a:t>
+              <a:t>2022-05-20</a:t>
             </a:fld>
             <a:endParaRPr lang="fr-CA"/>
           </a:p>
@@ -2684,7 +3020,7 @@
           <a:p>
             <a:fld id="{C396F5D7-5EA1-4438-8E1D-528E9996FEB9}" type="datetimeFigureOut">
               <a:rPr lang="fr-CA" smtClean="0"/>
-              <a:t>2022-04-26</a:t>
+              <a:t>2022-05-20</a:t>
             </a:fld>
             <a:endParaRPr lang="fr-CA"/>
           </a:p>
@@ -2927,7 +3263,7 @@
           <a:p>
             <a:fld id="{C396F5D7-5EA1-4438-8E1D-528E9996FEB9}" type="datetimeFigureOut">
               <a:rPr lang="fr-CA" smtClean="0"/>
-              <a:t>2022-04-26</a:t>
+              <a:t>2022-05-20</a:t>
             </a:fld>
             <a:endParaRPr lang="fr-CA"/>
           </a:p>
@@ -3386,7 +3722,7 @@
 </p:sld>
 </file>
 
-<file path=ppt/slides/slide2.xml><?xml version="1.0" encoding="utf-8"?>
+<file path=ppt/slides/slide10.xml><?xml version="1.0" encoding="utf-8"?>
 <p:sld xmlns:a="http://schemas.openxmlformats.org/drawingml/2006/main" xmlns:r="http://schemas.openxmlformats.org/officeDocument/2006/relationships" xmlns:p="http://schemas.openxmlformats.org/presentationml/2006/main">
   <p:cSld>
     <p:spTree>
@@ -3405,10 +3741,10 @@
       </p:grpSpPr>
       <p:pic>
         <p:nvPicPr>
-          <p:cNvPr id="4" name="Image 3">
-            <a:extLst>
-              <a:ext uri="{FF2B5EF4-FFF2-40B4-BE49-F238E27FC236}">
-                <a16:creationId xmlns:a16="http://schemas.microsoft.com/office/drawing/2014/main" id="{67F9DEDF-8CAF-4E04-AB9E-A702C57A194C}"/>
+          <p:cNvPr id="2" name="Image 1">
+            <a:extLst>
+              <a:ext uri="{FF2B5EF4-FFF2-40B4-BE49-F238E27FC236}">
+                <a16:creationId xmlns:a16="http://schemas.microsoft.com/office/drawing/2014/main" id="{BE3DF13D-95A2-429B-AADC-137A20DA5FA2}"/>
               </a:ext>
             </a:extLst>
           </p:cNvPr>
@@ -3417,15 +3753,16 @@
           </p:cNvPicPr>
           <p:nvPr/>
         </p:nvPicPr>
-        <p:blipFill rotWithShape="1">
+        <p:blipFill>
           <a:blip r:embed="rId2"/>
-          <a:srcRect r="60188" b="4074"/>
-          <a:stretch/>
+          <a:stretch>
+            <a:fillRect/>
+          </a:stretch>
         </p:blipFill>
         <p:spPr>
           <a:xfrm>
-            <a:off x="533400" y="674370"/>
-            <a:ext cx="4853940" cy="4933950"/>
+            <a:off x="0" y="857250"/>
+            <a:ext cx="12192000" cy="5143500"/>
           </a:xfrm>
           <a:prstGeom prst="rect">
             <a:avLst/>
@@ -3439,6 +3776,116 @@
           </a:ln>
         </p:spPr>
       </p:pic>
+    </p:spTree>
+    <p:extLst>
+      <p:ext uri="{BB962C8B-B14F-4D97-AF65-F5344CB8AC3E}">
+        <p14:creationId xmlns:p14="http://schemas.microsoft.com/office/powerpoint/2010/main" val="1502691826"/>
+      </p:ext>
+    </p:extLst>
+  </p:cSld>
+  <p:clrMapOvr>
+    <a:masterClrMapping/>
+  </p:clrMapOvr>
+</p:sld>
+</file>
+
+<file path=ppt/slides/slide11.xml><?xml version="1.0" encoding="utf-8"?>
+<p:sld xmlns:a="http://schemas.openxmlformats.org/drawingml/2006/main" xmlns:r="http://schemas.openxmlformats.org/officeDocument/2006/relationships" xmlns:p="http://schemas.openxmlformats.org/presentationml/2006/main">
+  <p:cSld>
+    <p:spTree>
+      <p:nvGrpSpPr>
+        <p:cNvPr id="1" name=""/>
+        <p:cNvGrpSpPr/>
+        <p:nvPr/>
+      </p:nvGrpSpPr>
+      <p:grpSpPr>
+        <a:xfrm>
+          <a:off x="0" y="0"/>
+          <a:ext cx="0" cy="0"/>
+          <a:chOff x="0" y="0"/>
+          <a:chExt cx="0" cy="0"/>
+        </a:xfrm>
+      </p:grpSpPr>
+      <p:sp>
+        <p:nvSpPr>
+          <p:cNvPr id="2" name="Titre 1">
+            <a:extLst>
+              <a:ext uri="{FF2B5EF4-FFF2-40B4-BE49-F238E27FC236}">
+                <a16:creationId xmlns:a16="http://schemas.microsoft.com/office/drawing/2014/main" id="{6A144CB2-82D9-4570-A23E-83A4A8AB57DD}"/>
+              </a:ext>
+            </a:extLst>
+          </p:cNvPr>
+          <p:cNvSpPr>
+            <a:spLocks noGrp="1"/>
+          </p:cNvSpPr>
+          <p:nvPr>
+            <p:ph type="title"/>
+          </p:nvPr>
+        </p:nvSpPr>
+        <p:spPr/>
+        <p:txBody>
+          <a:bodyPr/>
+          <a:lstStyle/>
+          <a:p>
+            <a:endParaRPr lang="fr-CA"/>
+          </a:p>
+        </p:txBody>
+      </p:sp>
+      <p:sp>
+        <p:nvSpPr>
+          <p:cNvPr id="3" name="Espace réservé du contenu 2">
+            <a:extLst>
+              <a:ext uri="{FF2B5EF4-FFF2-40B4-BE49-F238E27FC236}">
+                <a16:creationId xmlns:a16="http://schemas.microsoft.com/office/drawing/2014/main" id="{A1912C2F-D52E-4687-AA4B-6F040C825CA4}"/>
+              </a:ext>
+            </a:extLst>
+          </p:cNvPr>
+          <p:cNvSpPr>
+            <a:spLocks noGrp="1"/>
+          </p:cNvSpPr>
+          <p:nvPr>
+            <p:ph idx="1"/>
+          </p:nvPr>
+        </p:nvSpPr>
+        <p:spPr/>
+        <p:txBody>
+          <a:bodyPr/>
+          <a:lstStyle/>
+          <a:p>
+            <a:endParaRPr lang="fr-CA"/>
+          </a:p>
+        </p:txBody>
+      </p:sp>
+    </p:spTree>
+    <p:extLst>
+      <p:ext uri="{BB962C8B-B14F-4D97-AF65-F5344CB8AC3E}">
+        <p14:creationId xmlns:p14="http://schemas.microsoft.com/office/powerpoint/2010/main" val="2501518047"/>
+      </p:ext>
+    </p:extLst>
+  </p:cSld>
+  <p:clrMapOvr>
+    <a:masterClrMapping/>
+  </p:clrMapOvr>
+</p:sld>
+</file>
+
+<file path=ppt/slides/slide2.xml><?xml version="1.0" encoding="utf-8"?>
+<p:sld xmlns:a="http://schemas.openxmlformats.org/drawingml/2006/main" xmlns:r="http://schemas.openxmlformats.org/officeDocument/2006/relationships" xmlns:p="http://schemas.openxmlformats.org/presentationml/2006/main">
+  <p:cSld>
+    <p:spTree>
+      <p:nvGrpSpPr>
+        <p:cNvPr id="1" name=""/>
+        <p:cNvGrpSpPr/>
+        <p:nvPr/>
+      </p:nvGrpSpPr>
+      <p:grpSpPr>
+        <a:xfrm>
+          <a:off x="0" y="0"/>
+          <a:ext cx="0" cy="0"/>
+          <a:chOff x="0" y="0"/>
+          <a:chExt cx="0" cy="0"/>
+        </a:xfrm>
+      </p:grpSpPr>
       <p:pic>
         <p:nvPicPr>
           <p:cNvPr id="5" name="Image 4">
@@ -3473,6 +3920,35 @@
               </a:schemeClr>
             </a:solidFill>
           </a:ln>
+        </p:spPr>
+      </p:pic>
+      <p:pic>
+        <p:nvPicPr>
+          <p:cNvPr id="2" name="Image 1">
+            <a:extLst>
+              <a:ext uri="{FF2B5EF4-FFF2-40B4-BE49-F238E27FC236}">
+                <a16:creationId xmlns:a16="http://schemas.microsoft.com/office/drawing/2014/main" id="{48DD7EDF-5BAC-4AD6-84F9-309E8EF795CA}"/>
+              </a:ext>
+            </a:extLst>
+          </p:cNvPr>
+          <p:cNvPicPr>
+            <a:picLocks noChangeAspect="1"/>
+          </p:cNvPicPr>
+          <p:nvPr/>
+        </p:nvPicPr>
+        <p:blipFill rotWithShape="1">
+          <a:blip r:embed="rId3"/>
+          <a:srcRect t="19630" r="61688" b="5703"/>
+          <a:stretch/>
+        </p:blipFill>
+        <p:spPr>
+          <a:xfrm>
+            <a:off x="0" y="1866900"/>
+            <a:ext cx="4671060" cy="3840480"/>
+          </a:xfrm>
+          <a:prstGeom prst="rect">
+            <a:avLst/>
+          </a:prstGeom>
         </p:spPr>
       </p:pic>
     </p:spTree>
@@ -3807,6 +4283,405 @@
     <p:extLst>
       <p:ext uri="{BB962C8B-B14F-4D97-AF65-F5344CB8AC3E}">
         <p14:creationId xmlns:p14="http://schemas.microsoft.com/office/powerpoint/2010/main" val="2973135706"/>
+      </p:ext>
+    </p:extLst>
+  </p:cSld>
+  <p:clrMapOvr>
+    <a:masterClrMapping/>
+  </p:clrMapOvr>
+</p:sld>
+</file>
+
+<file path=ppt/slides/slide4.xml><?xml version="1.0" encoding="utf-8"?>
+<p:sld xmlns:a="http://schemas.openxmlformats.org/drawingml/2006/main" xmlns:r="http://schemas.openxmlformats.org/officeDocument/2006/relationships" xmlns:p="http://schemas.openxmlformats.org/presentationml/2006/main">
+  <p:cSld>
+    <p:spTree>
+      <p:nvGrpSpPr>
+        <p:cNvPr id="1" name=""/>
+        <p:cNvGrpSpPr/>
+        <p:nvPr/>
+      </p:nvGrpSpPr>
+      <p:grpSpPr>
+        <a:xfrm>
+          <a:off x="0" y="0"/>
+          <a:ext cx="0" cy="0"/>
+          <a:chOff x="0" y="0"/>
+          <a:chExt cx="0" cy="0"/>
+        </a:xfrm>
+      </p:grpSpPr>
+      <p:pic>
+        <p:nvPicPr>
+          <p:cNvPr id="3" name="Image 2">
+            <a:extLst>
+              <a:ext uri="{FF2B5EF4-FFF2-40B4-BE49-F238E27FC236}">
+                <a16:creationId xmlns:a16="http://schemas.microsoft.com/office/drawing/2014/main" id="{42FADC67-AA9F-48E2-AF07-9F0A23D66A6F}"/>
+              </a:ext>
+            </a:extLst>
+          </p:cNvPr>
+          <p:cNvPicPr>
+            <a:picLocks noChangeAspect="1"/>
+          </p:cNvPicPr>
+          <p:nvPr/>
+        </p:nvPicPr>
+        <p:blipFill>
+          <a:blip r:embed="rId2"/>
+          <a:stretch>
+            <a:fillRect/>
+          </a:stretch>
+        </p:blipFill>
+        <p:spPr>
+          <a:xfrm>
+            <a:off x="0" y="857250"/>
+            <a:ext cx="12192000" cy="5143500"/>
+          </a:xfrm>
+          <a:prstGeom prst="rect">
+            <a:avLst/>
+          </a:prstGeom>
+          <a:ln>
+            <a:solidFill>
+              <a:schemeClr val="bg1">
+                <a:lumMod val="50000"/>
+              </a:schemeClr>
+            </a:solidFill>
+          </a:ln>
+        </p:spPr>
+      </p:pic>
+    </p:spTree>
+    <p:extLst>
+      <p:ext uri="{BB962C8B-B14F-4D97-AF65-F5344CB8AC3E}">
+        <p14:creationId xmlns:p14="http://schemas.microsoft.com/office/powerpoint/2010/main" val="22912130"/>
+      </p:ext>
+    </p:extLst>
+  </p:cSld>
+  <p:clrMapOvr>
+    <a:masterClrMapping/>
+  </p:clrMapOvr>
+</p:sld>
+</file>
+
+<file path=ppt/slides/slide5.xml><?xml version="1.0" encoding="utf-8"?>
+<p:sld xmlns:a="http://schemas.openxmlformats.org/drawingml/2006/main" xmlns:r="http://schemas.openxmlformats.org/officeDocument/2006/relationships" xmlns:p="http://schemas.openxmlformats.org/presentationml/2006/main">
+  <p:cSld>
+    <p:spTree>
+      <p:nvGrpSpPr>
+        <p:cNvPr id="1" name=""/>
+        <p:cNvGrpSpPr/>
+        <p:nvPr/>
+      </p:nvGrpSpPr>
+      <p:grpSpPr>
+        <a:xfrm>
+          <a:off x="0" y="0"/>
+          <a:ext cx="0" cy="0"/>
+          <a:chOff x="0" y="0"/>
+          <a:chExt cx="0" cy="0"/>
+        </a:xfrm>
+      </p:grpSpPr>
+      <p:pic>
+        <p:nvPicPr>
+          <p:cNvPr id="5" name="Image 4">
+            <a:extLst>
+              <a:ext uri="{FF2B5EF4-FFF2-40B4-BE49-F238E27FC236}">
+                <a16:creationId xmlns:a16="http://schemas.microsoft.com/office/drawing/2014/main" id="{08852E05-6A38-4E84-8333-D12A8AA75D48}"/>
+              </a:ext>
+            </a:extLst>
+          </p:cNvPr>
+          <p:cNvPicPr>
+            <a:picLocks noChangeAspect="1"/>
+          </p:cNvPicPr>
+          <p:nvPr/>
+        </p:nvPicPr>
+        <p:blipFill>
+          <a:blip r:embed="rId2"/>
+          <a:stretch>
+            <a:fillRect/>
+          </a:stretch>
+        </p:blipFill>
+        <p:spPr>
+          <a:xfrm>
+            <a:off x="306996" y="1033027"/>
+            <a:ext cx="12192000" cy="5143500"/>
+          </a:xfrm>
+          <a:prstGeom prst="rect">
+            <a:avLst/>
+          </a:prstGeom>
+          <a:ln>
+            <a:solidFill>
+              <a:schemeClr val="bg1">
+                <a:lumMod val="50000"/>
+              </a:schemeClr>
+            </a:solidFill>
+          </a:ln>
+        </p:spPr>
+      </p:pic>
+    </p:spTree>
+    <p:extLst>
+      <p:ext uri="{BB962C8B-B14F-4D97-AF65-F5344CB8AC3E}">
+        <p14:creationId xmlns:p14="http://schemas.microsoft.com/office/powerpoint/2010/main" val="2247806275"/>
+      </p:ext>
+    </p:extLst>
+  </p:cSld>
+  <p:clrMapOvr>
+    <a:masterClrMapping/>
+  </p:clrMapOvr>
+</p:sld>
+</file>
+
+<file path=ppt/slides/slide6.xml><?xml version="1.0" encoding="utf-8"?>
+<p:sld xmlns:a="http://schemas.openxmlformats.org/drawingml/2006/main" xmlns:r="http://schemas.openxmlformats.org/officeDocument/2006/relationships" xmlns:p="http://schemas.openxmlformats.org/presentationml/2006/main">
+  <p:cSld>
+    <p:spTree>
+      <p:nvGrpSpPr>
+        <p:cNvPr id="1" name=""/>
+        <p:cNvGrpSpPr/>
+        <p:nvPr/>
+      </p:nvGrpSpPr>
+      <p:grpSpPr>
+        <a:xfrm>
+          <a:off x="0" y="0"/>
+          <a:ext cx="0" cy="0"/>
+          <a:chOff x="0" y="0"/>
+          <a:chExt cx="0" cy="0"/>
+        </a:xfrm>
+      </p:grpSpPr>
+      <p:pic>
+        <p:nvPicPr>
+          <p:cNvPr id="4" name="Image 3">
+            <a:extLst>
+              <a:ext uri="{FF2B5EF4-FFF2-40B4-BE49-F238E27FC236}">
+                <a16:creationId xmlns:a16="http://schemas.microsoft.com/office/drawing/2014/main" id="{12BF5DBD-51A6-4449-AA67-5DBD4CBF64FD}"/>
+              </a:ext>
+            </a:extLst>
+          </p:cNvPr>
+          <p:cNvPicPr>
+            <a:picLocks noChangeAspect="1"/>
+          </p:cNvPicPr>
+          <p:nvPr/>
+        </p:nvPicPr>
+        <p:blipFill rotWithShape="1">
+          <a:blip r:embed="rId2"/>
+          <a:srcRect l="313" t="12370" r="22062" b="9703"/>
+          <a:stretch/>
+        </p:blipFill>
+        <p:spPr>
+          <a:xfrm>
+            <a:off x="800100" y="1264920"/>
+            <a:ext cx="9464040" cy="4008120"/>
+          </a:xfrm>
+          <a:prstGeom prst="rect">
+            <a:avLst/>
+          </a:prstGeom>
+          <a:ln>
+            <a:solidFill>
+              <a:schemeClr val="bg1">
+                <a:lumMod val="50000"/>
+              </a:schemeClr>
+            </a:solidFill>
+          </a:ln>
+        </p:spPr>
+      </p:pic>
+    </p:spTree>
+    <p:extLst>
+      <p:ext uri="{BB962C8B-B14F-4D97-AF65-F5344CB8AC3E}">
+        <p14:creationId xmlns:p14="http://schemas.microsoft.com/office/powerpoint/2010/main" val="3574589000"/>
+      </p:ext>
+    </p:extLst>
+  </p:cSld>
+  <p:clrMapOvr>
+    <a:masterClrMapping/>
+  </p:clrMapOvr>
+</p:sld>
+</file>
+
+<file path=ppt/slides/slide7.xml><?xml version="1.0" encoding="utf-8"?>
+<p:sld xmlns:a="http://schemas.openxmlformats.org/drawingml/2006/main" xmlns:r="http://schemas.openxmlformats.org/officeDocument/2006/relationships" xmlns:p="http://schemas.openxmlformats.org/presentationml/2006/main">
+  <p:cSld>
+    <p:spTree>
+      <p:nvGrpSpPr>
+        <p:cNvPr id="1" name=""/>
+        <p:cNvGrpSpPr/>
+        <p:nvPr/>
+      </p:nvGrpSpPr>
+      <p:grpSpPr>
+        <a:xfrm>
+          <a:off x="0" y="0"/>
+          <a:ext cx="0" cy="0"/>
+          <a:chOff x="0" y="0"/>
+          <a:chExt cx="0" cy="0"/>
+        </a:xfrm>
+      </p:grpSpPr>
+      <p:pic>
+        <p:nvPicPr>
+          <p:cNvPr id="4" name="Image 3">
+            <a:extLst>
+              <a:ext uri="{FF2B5EF4-FFF2-40B4-BE49-F238E27FC236}">
+                <a16:creationId xmlns:a16="http://schemas.microsoft.com/office/drawing/2014/main" id="{07DC9A66-0F2C-4848-A243-8A419A8C33EC}"/>
+              </a:ext>
+            </a:extLst>
+          </p:cNvPr>
+          <p:cNvPicPr>
+            <a:picLocks noChangeAspect="1"/>
+          </p:cNvPicPr>
+          <p:nvPr/>
+        </p:nvPicPr>
+        <p:blipFill rotWithShape="1">
+          <a:blip r:embed="rId2"/>
+          <a:srcRect t="13408" r="23375" b="9703"/>
+          <a:stretch/>
+        </p:blipFill>
+        <p:spPr>
+          <a:xfrm>
+            <a:off x="0" y="1546860"/>
+            <a:ext cx="9342120" cy="3954780"/>
+          </a:xfrm>
+          <a:prstGeom prst="rect">
+            <a:avLst/>
+          </a:prstGeom>
+          <a:ln>
+            <a:solidFill>
+              <a:schemeClr val="bg1">
+                <a:lumMod val="50000"/>
+              </a:schemeClr>
+            </a:solidFill>
+          </a:ln>
+        </p:spPr>
+      </p:pic>
+    </p:spTree>
+    <p:extLst>
+      <p:ext uri="{BB962C8B-B14F-4D97-AF65-F5344CB8AC3E}">
+        <p14:creationId xmlns:p14="http://schemas.microsoft.com/office/powerpoint/2010/main" val="3080628338"/>
+      </p:ext>
+    </p:extLst>
+  </p:cSld>
+  <p:clrMapOvr>
+    <a:masterClrMapping/>
+  </p:clrMapOvr>
+</p:sld>
+</file>
+
+<file path=ppt/slides/slide8.xml><?xml version="1.0" encoding="utf-8"?>
+<p:sld xmlns:a="http://schemas.openxmlformats.org/drawingml/2006/main" xmlns:r="http://schemas.openxmlformats.org/officeDocument/2006/relationships" xmlns:p="http://schemas.openxmlformats.org/presentationml/2006/main">
+  <p:cSld>
+    <p:spTree>
+      <p:nvGrpSpPr>
+        <p:cNvPr id="1" name=""/>
+        <p:cNvGrpSpPr/>
+        <p:nvPr/>
+      </p:nvGrpSpPr>
+      <p:grpSpPr>
+        <a:xfrm>
+          <a:off x="0" y="0"/>
+          <a:ext cx="0" cy="0"/>
+          <a:chOff x="0" y="0"/>
+          <a:chExt cx="0" cy="0"/>
+        </a:xfrm>
+      </p:grpSpPr>
+      <p:pic>
+        <p:nvPicPr>
+          <p:cNvPr id="4" name="Image 3">
+            <a:extLst>
+              <a:ext uri="{FF2B5EF4-FFF2-40B4-BE49-F238E27FC236}">
+                <a16:creationId xmlns:a16="http://schemas.microsoft.com/office/drawing/2014/main" id="{88045CE1-8B61-4451-9B60-1C8535C419B0}"/>
+              </a:ext>
+            </a:extLst>
+          </p:cNvPr>
+          <p:cNvPicPr>
+            <a:picLocks noChangeAspect="1"/>
+          </p:cNvPicPr>
+          <p:nvPr/>
+        </p:nvPicPr>
+        <p:blipFill rotWithShape="1">
+          <a:blip r:embed="rId2"/>
+          <a:srcRect t="11778" r="24000" b="15037"/>
+          <a:stretch/>
+        </p:blipFill>
+        <p:spPr>
+          <a:xfrm>
+            <a:off x="0" y="1463040"/>
+            <a:ext cx="9265920" cy="3764280"/>
+          </a:xfrm>
+          <a:prstGeom prst="rect">
+            <a:avLst/>
+          </a:prstGeom>
+          <a:ln>
+            <a:solidFill>
+              <a:schemeClr val="bg1">
+                <a:lumMod val="50000"/>
+              </a:schemeClr>
+            </a:solidFill>
+          </a:ln>
+        </p:spPr>
+      </p:pic>
+    </p:spTree>
+    <p:extLst>
+      <p:ext uri="{BB962C8B-B14F-4D97-AF65-F5344CB8AC3E}">
+        <p14:creationId xmlns:p14="http://schemas.microsoft.com/office/powerpoint/2010/main" val="743851793"/>
+      </p:ext>
+    </p:extLst>
+  </p:cSld>
+  <p:clrMapOvr>
+    <a:masterClrMapping/>
+  </p:clrMapOvr>
+</p:sld>
+</file>
+
+<file path=ppt/slides/slide9.xml><?xml version="1.0" encoding="utf-8"?>
+<p:sld xmlns:a="http://schemas.openxmlformats.org/drawingml/2006/main" xmlns:r="http://schemas.openxmlformats.org/officeDocument/2006/relationships" xmlns:p="http://schemas.openxmlformats.org/presentationml/2006/main">
+  <p:cSld>
+    <p:spTree>
+      <p:nvGrpSpPr>
+        <p:cNvPr id="1" name=""/>
+        <p:cNvGrpSpPr/>
+        <p:nvPr/>
+      </p:nvGrpSpPr>
+      <p:grpSpPr>
+        <a:xfrm>
+          <a:off x="0" y="0"/>
+          <a:ext cx="0" cy="0"/>
+          <a:chOff x="0" y="0"/>
+          <a:chExt cx="0" cy="0"/>
+        </a:xfrm>
+      </p:grpSpPr>
+      <p:pic>
+        <p:nvPicPr>
+          <p:cNvPr id="6" name="Image 5">
+            <a:extLst>
+              <a:ext uri="{FF2B5EF4-FFF2-40B4-BE49-F238E27FC236}">
+                <a16:creationId xmlns:a16="http://schemas.microsoft.com/office/drawing/2014/main" id="{D70F5FF4-6B60-4FB1-95C3-65A7134868CA}"/>
+              </a:ext>
+            </a:extLst>
+          </p:cNvPr>
+          <p:cNvPicPr>
+            <a:picLocks noChangeAspect="1"/>
+          </p:cNvPicPr>
+          <p:nvPr/>
+        </p:nvPicPr>
+        <p:blipFill>
+          <a:blip r:embed="rId2"/>
+          <a:stretch>
+            <a:fillRect/>
+          </a:stretch>
+        </p:blipFill>
+        <p:spPr>
+          <a:xfrm>
+            <a:off x="0" y="857250"/>
+            <a:ext cx="12192000" cy="5143500"/>
+          </a:xfrm>
+          <a:prstGeom prst="rect">
+            <a:avLst/>
+          </a:prstGeom>
+          <a:ln>
+            <a:solidFill>
+              <a:schemeClr val="bg1">
+                <a:lumMod val="50000"/>
+              </a:schemeClr>
+            </a:solidFill>
+          </a:ln>
+        </p:spPr>
+      </p:pic>
+    </p:spTree>
+    <p:extLst>
+      <p:ext uri="{BB962C8B-B14F-4D97-AF65-F5344CB8AC3E}">
+        <p14:creationId xmlns:p14="http://schemas.microsoft.com/office/powerpoint/2010/main" val="3805487723"/>
       </p:ext>
     </p:extLst>
   </p:cSld>
@@ -4385,16 +5260,16 @@
 <file path=customXml/itemProps3.xml><?xml version="1.0" encoding="utf-8"?>
 <ds:datastoreItem xmlns:ds="http://schemas.openxmlformats.org/officeDocument/2006/customXml" ds:itemID="{F95B8AFA-4EC7-4E42-87A1-D50FA71FA815}">
   <ds:schemaRefs>
-    <ds:schemaRef ds:uri="0521128b-fa6f-4216-a311-c6ddee8c8316"/>
-    <ds:schemaRef ds:uri="http://schemas.openxmlformats.org/package/2006/metadata/core-properties"/>
-    <ds:schemaRef ds:uri="http://purl.org/dc/elements/1.1/"/>
     <ds:schemaRef ds:uri="http://schemas.microsoft.com/office/2006/metadata/properties"/>
     <ds:schemaRef ds:uri="http://purl.org/dc/dcmitype/"/>
-    <ds:schemaRef ds:uri="http://schemas.microsoft.com/office/2006/documentManagement/types"/>
     <ds:schemaRef ds:uri="http://schemas.microsoft.com/office/infopath/2007/PartnerControls"/>
     <ds:schemaRef ds:uri="52e651b7-b90a-4e20-8373-f1ed72147340"/>
+    <ds:schemaRef ds:uri="http://purl.org/dc/elements/1.1/"/>
+    <ds:schemaRef ds:uri="0521128b-fa6f-4216-a311-c6ddee8c8316"/>
     <ds:schemaRef ds:uri="http://www.w3.org/XML/1998/namespace"/>
+    <ds:schemaRef ds:uri="http://schemas.microsoft.com/office/2006/documentManagement/types"/>
     <ds:schemaRef ds:uri="http://purl.org/dc/terms/"/>
+    <ds:schemaRef ds:uri="http://schemas.openxmlformats.org/package/2006/metadata/core-properties"/>
   </ds:schemaRefs>
 </ds:datastoreItem>
 </file>
</xml_diff>

<commit_message>
Minor corrections throughout the doc
</commit_message>
<xml_diff>
--- a/Figures/Présentation1.pptx
+++ b/Figures/Présentation1.pptx
@@ -16,6 +16,8 @@
     <p:sldId id="264" r:id="rId13"/>
     <p:sldId id="265" r:id="rId14"/>
     <p:sldId id="266" r:id="rId15"/>
+    <p:sldId id="267" r:id="rId16"/>
+    <p:sldId id="268" r:id="rId17"/>
   </p:sldIdLst>
   <p:sldSz cx="12192000" cy="6858000"/>
   <p:notesSz cx="6858000" cy="9144000"/>
@@ -127,7 +129,7 @@
   <pc:docChgLst>
     <pc:chgData name="Simon Dufour" userId="38428de1-9cbc-422b-8b16-f4b0dc7c0437" providerId="ADAL" clId="{45AC5843-6491-4A37-8D18-05C67A4D8CE1}"/>
     <pc:docChg chg="undo custSel addSld delSld modSld">
-      <pc:chgData name="Simon Dufour" userId="38428de1-9cbc-422b-8b16-f4b0dc7c0437" providerId="ADAL" clId="{45AC5843-6491-4A37-8D18-05C67A4D8CE1}" dt="2022-05-20T18:25:14.792" v="64" actId="208"/>
+      <pc:chgData name="Simon Dufour" userId="38428de1-9cbc-422b-8b16-f4b0dc7c0437" providerId="ADAL" clId="{45AC5843-6491-4A37-8D18-05C67A4D8CE1}" dt="2022-06-07T17:52:09.448" v="73" actId="208"/>
       <pc:docMkLst>
         <pc:docMk/>
       </pc:docMkLst>
@@ -433,12 +435,66 @@
           </ac:picMkLst>
         </pc:picChg>
       </pc:sldChg>
-      <pc:sldChg chg="add">
-        <pc:chgData name="Simon Dufour" userId="38428de1-9cbc-422b-8b16-f4b0dc7c0437" providerId="ADAL" clId="{45AC5843-6491-4A37-8D18-05C67A4D8CE1}" dt="2022-05-20T18:25:02.840" v="61"/>
+      <pc:sldChg chg="addSp delSp modSp add">
+        <pc:chgData name="Simon Dufour" userId="38428de1-9cbc-422b-8b16-f4b0dc7c0437" providerId="ADAL" clId="{45AC5843-6491-4A37-8D18-05C67A4D8CE1}" dt="2022-05-25T13:00:45.514" v="70" actId="208"/>
         <pc:sldMkLst>
           <pc:docMk/>
           <pc:sldMk cId="2501518047" sldId="266"/>
         </pc:sldMkLst>
+        <pc:spChg chg="del">
+          <ac:chgData name="Simon Dufour" userId="38428de1-9cbc-422b-8b16-f4b0dc7c0437" providerId="ADAL" clId="{45AC5843-6491-4A37-8D18-05C67A4D8CE1}" dt="2022-05-24T20:52:41.311" v="65" actId="478"/>
+          <ac:spMkLst>
+            <pc:docMk/>
+            <pc:sldMk cId="2501518047" sldId="266"/>
+            <ac:spMk id="2" creationId="{6A144CB2-82D9-4570-A23E-83A4A8AB57DD}"/>
+          </ac:spMkLst>
+        </pc:spChg>
+        <pc:spChg chg="del">
+          <ac:chgData name="Simon Dufour" userId="38428de1-9cbc-422b-8b16-f4b0dc7c0437" providerId="ADAL" clId="{45AC5843-6491-4A37-8D18-05C67A4D8CE1}" dt="2022-05-24T20:52:41.311" v="65" actId="478"/>
+          <ac:spMkLst>
+            <pc:docMk/>
+            <pc:sldMk cId="2501518047" sldId="266"/>
+            <ac:spMk id="3" creationId="{A1912C2F-D52E-4687-AA4B-6F040C825CA4}"/>
+          </ac:spMkLst>
+        </pc:spChg>
+        <pc:picChg chg="add mod">
+          <ac:chgData name="Simon Dufour" userId="38428de1-9cbc-422b-8b16-f4b0dc7c0437" providerId="ADAL" clId="{45AC5843-6491-4A37-8D18-05C67A4D8CE1}" dt="2022-05-25T13:00:45.514" v="70" actId="208"/>
+          <ac:picMkLst>
+            <pc:docMk/>
+            <pc:sldMk cId="2501518047" sldId="266"/>
+            <ac:picMk id="4" creationId="{A13DE7ED-E9ED-4E81-B735-5077555E9DEE}"/>
+          </ac:picMkLst>
+        </pc:picChg>
+      </pc:sldChg>
+      <pc:sldChg chg="addSp modSp add">
+        <pc:chgData name="Simon Dufour" userId="38428de1-9cbc-422b-8b16-f4b0dc7c0437" providerId="ADAL" clId="{45AC5843-6491-4A37-8D18-05C67A4D8CE1}" dt="2022-05-25T13:00:16.107" v="69" actId="208"/>
+        <pc:sldMkLst>
+          <pc:docMk/>
+          <pc:sldMk cId="1912450822" sldId="267"/>
+        </pc:sldMkLst>
+        <pc:picChg chg="add mod">
+          <ac:chgData name="Simon Dufour" userId="38428de1-9cbc-422b-8b16-f4b0dc7c0437" providerId="ADAL" clId="{45AC5843-6491-4A37-8D18-05C67A4D8CE1}" dt="2022-05-25T13:00:16.107" v="69" actId="208"/>
+          <ac:picMkLst>
+            <pc:docMk/>
+            <pc:sldMk cId="1912450822" sldId="267"/>
+            <ac:picMk id="4" creationId="{B53FAD39-A85E-408D-80C6-8414AF91A45D}"/>
+          </ac:picMkLst>
+        </pc:picChg>
+      </pc:sldChg>
+      <pc:sldChg chg="addSp modSp add">
+        <pc:chgData name="Simon Dufour" userId="38428de1-9cbc-422b-8b16-f4b0dc7c0437" providerId="ADAL" clId="{45AC5843-6491-4A37-8D18-05C67A4D8CE1}" dt="2022-06-07T17:52:09.448" v="73" actId="208"/>
+        <pc:sldMkLst>
+          <pc:docMk/>
+          <pc:sldMk cId="2992135697" sldId="268"/>
+        </pc:sldMkLst>
+        <pc:picChg chg="add mod">
+          <ac:chgData name="Simon Dufour" userId="38428de1-9cbc-422b-8b16-f4b0dc7c0437" providerId="ADAL" clId="{45AC5843-6491-4A37-8D18-05C67A4D8CE1}" dt="2022-06-07T17:52:09.448" v="73" actId="208"/>
+          <ac:picMkLst>
+            <pc:docMk/>
+            <pc:sldMk cId="2992135697" sldId="268"/>
+            <ac:picMk id="4" creationId="{4D632ABD-FEDA-4DA2-9E8D-D68AE4167E5A}"/>
+          </ac:picMkLst>
+        </pc:picChg>
       </pc:sldChg>
     </pc:docChg>
   </pc:docChgLst>
@@ -594,7 +650,7 @@
           <a:p>
             <a:fld id="{C396F5D7-5EA1-4438-8E1D-528E9996FEB9}" type="datetimeFigureOut">
               <a:rPr lang="fr-CA" smtClean="0"/>
-              <a:t>2022-05-20</a:t>
+              <a:t>2022-06-07</a:t>
             </a:fld>
             <a:endParaRPr lang="fr-CA"/>
           </a:p>
@@ -794,7 +850,7 @@
           <a:p>
             <a:fld id="{C396F5D7-5EA1-4438-8E1D-528E9996FEB9}" type="datetimeFigureOut">
               <a:rPr lang="fr-CA" smtClean="0"/>
-              <a:t>2022-05-20</a:t>
+              <a:t>2022-06-07</a:t>
             </a:fld>
             <a:endParaRPr lang="fr-CA"/>
           </a:p>
@@ -1004,7 +1060,7 @@
           <a:p>
             <a:fld id="{C396F5D7-5EA1-4438-8E1D-528E9996FEB9}" type="datetimeFigureOut">
               <a:rPr lang="fr-CA" smtClean="0"/>
-              <a:t>2022-05-20</a:t>
+              <a:t>2022-06-07</a:t>
             </a:fld>
             <a:endParaRPr lang="fr-CA"/>
           </a:p>
@@ -1204,7 +1260,7 @@
           <a:p>
             <a:fld id="{C396F5D7-5EA1-4438-8E1D-528E9996FEB9}" type="datetimeFigureOut">
               <a:rPr lang="fr-CA" smtClean="0"/>
-              <a:t>2022-05-20</a:t>
+              <a:t>2022-06-07</a:t>
             </a:fld>
             <a:endParaRPr lang="fr-CA"/>
           </a:p>
@@ -1480,7 +1536,7 @@
           <a:p>
             <a:fld id="{C396F5D7-5EA1-4438-8E1D-528E9996FEB9}" type="datetimeFigureOut">
               <a:rPr lang="fr-CA" smtClean="0"/>
-              <a:t>2022-05-20</a:t>
+              <a:t>2022-06-07</a:t>
             </a:fld>
             <a:endParaRPr lang="fr-CA"/>
           </a:p>
@@ -1748,7 +1804,7 @@
           <a:p>
             <a:fld id="{C396F5D7-5EA1-4438-8E1D-528E9996FEB9}" type="datetimeFigureOut">
               <a:rPr lang="fr-CA" smtClean="0"/>
-              <a:t>2022-05-20</a:t>
+              <a:t>2022-06-07</a:t>
             </a:fld>
             <a:endParaRPr lang="fr-CA"/>
           </a:p>
@@ -2163,7 +2219,7 @@
           <a:p>
             <a:fld id="{C396F5D7-5EA1-4438-8E1D-528E9996FEB9}" type="datetimeFigureOut">
               <a:rPr lang="fr-CA" smtClean="0"/>
-              <a:t>2022-05-20</a:t>
+              <a:t>2022-06-07</a:t>
             </a:fld>
             <a:endParaRPr lang="fr-CA"/>
           </a:p>
@@ -2305,7 +2361,7 @@
           <a:p>
             <a:fld id="{C396F5D7-5EA1-4438-8E1D-528E9996FEB9}" type="datetimeFigureOut">
               <a:rPr lang="fr-CA" smtClean="0"/>
-              <a:t>2022-05-20</a:t>
+              <a:t>2022-06-07</a:t>
             </a:fld>
             <a:endParaRPr lang="fr-CA"/>
           </a:p>
@@ -2418,7 +2474,7 @@
           <a:p>
             <a:fld id="{C396F5D7-5EA1-4438-8E1D-528E9996FEB9}" type="datetimeFigureOut">
               <a:rPr lang="fr-CA" smtClean="0"/>
-              <a:t>2022-05-20</a:t>
+              <a:t>2022-06-07</a:t>
             </a:fld>
             <a:endParaRPr lang="fr-CA"/>
           </a:p>
@@ -2731,7 +2787,7 @@
           <a:p>
             <a:fld id="{C396F5D7-5EA1-4438-8E1D-528E9996FEB9}" type="datetimeFigureOut">
               <a:rPr lang="fr-CA" smtClean="0"/>
-              <a:t>2022-05-20</a:t>
+              <a:t>2022-06-07</a:t>
             </a:fld>
             <a:endParaRPr lang="fr-CA"/>
           </a:p>
@@ -3020,7 +3076,7 @@
           <a:p>
             <a:fld id="{C396F5D7-5EA1-4438-8E1D-528E9996FEB9}" type="datetimeFigureOut">
               <a:rPr lang="fr-CA" smtClean="0"/>
-              <a:t>2022-05-20</a:t>
+              <a:t>2022-06-07</a:t>
             </a:fld>
             <a:endParaRPr lang="fr-CA"/>
           </a:p>
@@ -3263,7 +3319,7 @@
           <a:p>
             <a:fld id="{C396F5D7-5EA1-4438-8E1D-528E9996FEB9}" type="datetimeFigureOut">
               <a:rPr lang="fr-CA" smtClean="0"/>
-              <a:t>2022-05-20</a:t>
+              <a:t>2022-06-07</a:t>
             </a:fld>
             <a:endParaRPr lang="fr-CA"/>
           </a:p>
@@ -3806,60 +3862,281 @@
           <a:chExt cx="0" cy="0"/>
         </a:xfrm>
       </p:grpSpPr>
-      <p:sp>
-        <p:nvSpPr>
-          <p:cNvPr id="2" name="Titre 1">
-            <a:extLst>
-              <a:ext uri="{FF2B5EF4-FFF2-40B4-BE49-F238E27FC236}">
-                <a16:creationId xmlns:a16="http://schemas.microsoft.com/office/drawing/2014/main" id="{6A144CB2-82D9-4570-A23E-83A4A8AB57DD}"/>
-              </a:ext>
-            </a:extLst>
-          </p:cNvPr>
-          <p:cNvSpPr>
-            <a:spLocks noGrp="1"/>
-          </p:cNvSpPr>
-          <p:nvPr>
-            <p:ph type="title"/>
-          </p:nvPr>
-        </p:nvSpPr>
-        <p:spPr/>
-        <p:txBody>
-          <a:bodyPr/>
-          <a:lstStyle/>
-          <a:p>
-            <a:endParaRPr lang="fr-CA"/>
-          </a:p>
-        </p:txBody>
-      </p:sp>
-      <p:sp>
-        <p:nvSpPr>
-          <p:cNvPr id="3" name="Espace réservé du contenu 2">
-            <a:extLst>
-              <a:ext uri="{FF2B5EF4-FFF2-40B4-BE49-F238E27FC236}">
-                <a16:creationId xmlns:a16="http://schemas.microsoft.com/office/drawing/2014/main" id="{A1912C2F-D52E-4687-AA4B-6F040C825CA4}"/>
-              </a:ext>
-            </a:extLst>
-          </p:cNvPr>
-          <p:cNvSpPr>
-            <a:spLocks noGrp="1"/>
-          </p:cNvSpPr>
-          <p:nvPr>
-            <p:ph idx="1"/>
-          </p:nvPr>
-        </p:nvSpPr>
-        <p:spPr/>
-        <p:txBody>
-          <a:bodyPr/>
-          <a:lstStyle/>
-          <a:p>
-            <a:endParaRPr lang="fr-CA"/>
-          </a:p>
-        </p:txBody>
-      </p:sp>
+      <p:pic>
+        <p:nvPicPr>
+          <p:cNvPr id="4" name="Image 3">
+            <a:extLst>
+              <a:ext uri="{FF2B5EF4-FFF2-40B4-BE49-F238E27FC236}">
+                <a16:creationId xmlns:a16="http://schemas.microsoft.com/office/drawing/2014/main" id="{A13DE7ED-E9ED-4E81-B735-5077555E9DEE}"/>
+              </a:ext>
+            </a:extLst>
+          </p:cNvPr>
+          <p:cNvPicPr>
+            <a:picLocks noChangeAspect="1"/>
+          </p:cNvPicPr>
+          <p:nvPr/>
+        </p:nvPicPr>
+        <p:blipFill>
+          <a:blip r:embed="rId2"/>
+          <a:stretch>
+            <a:fillRect/>
+          </a:stretch>
+        </p:blipFill>
+        <p:spPr>
+          <a:xfrm>
+            <a:off x="0" y="857250"/>
+            <a:ext cx="12192000" cy="5143500"/>
+          </a:xfrm>
+          <a:prstGeom prst="rect">
+            <a:avLst/>
+          </a:prstGeom>
+          <a:ln>
+            <a:solidFill>
+              <a:schemeClr val="bg1">
+                <a:lumMod val="50000"/>
+              </a:schemeClr>
+            </a:solidFill>
+          </a:ln>
+        </p:spPr>
+      </p:pic>
     </p:spTree>
     <p:extLst>
       <p:ext uri="{BB962C8B-B14F-4D97-AF65-F5344CB8AC3E}">
         <p14:creationId xmlns:p14="http://schemas.microsoft.com/office/powerpoint/2010/main" val="2501518047"/>
+      </p:ext>
+    </p:extLst>
+  </p:cSld>
+  <p:clrMapOvr>
+    <a:masterClrMapping/>
+  </p:clrMapOvr>
+</p:sld>
+</file>
+
+<file path=ppt/slides/slide12.xml><?xml version="1.0" encoding="utf-8"?>
+<p:sld xmlns:a="http://schemas.openxmlformats.org/drawingml/2006/main" xmlns:r="http://schemas.openxmlformats.org/officeDocument/2006/relationships" xmlns:p="http://schemas.openxmlformats.org/presentationml/2006/main">
+  <p:cSld>
+    <p:spTree>
+      <p:nvGrpSpPr>
+        <p:cNvPr id="1" name=""/>
+        <p:cNvGrpSpPr/>
+        <p:nvPr/>
+      </p:nvGrpSpPr>
+      <p:grpSpPr>
+        <a:xfrm>
+          <a:off x="0" y="0"/>
+          <a:ext cx="0" cy="0"/>
+          <a:chOff x="0" y="0"/>
+          <a:chExt cx="0" cy="0"/>
+        </a:xfrm>
+      </p:grpSpPr>
+      <p:sp>
+        <p:nvSpPr>
+          <p:cNvPr id="2" name="Titre 1">
+            <a:extLst>
+              <a:ext uri="{FF2B5EF4-FFF2-40B4-BE49-F238E27FC236}">
+                <a16:creationId xmlns:a16="http://schemas.microsoft.com/office/drawing/2014/main" id="{904E1644-BFD4-43A0-BACD-9DEFAD214E35}"/>
+              </a:ext>
+            </a:extLst>
+          </p:cNvPr>
+          <p:cNvSpPr>
+            <a:spLocks noGrp="1"/>
+          </p:cNvSpPr>
+          <p:nvPr>
+            <p:ph type="title"/>
+          </p:nvPr>
+        </p:nvSpPr>
+        <p:spPr/>
+        <p:txBody>
+          <a:bodyPr/>
+          <a:lstStyle/>
+          <a:p>
+            <a:endParaRPr lang="fr-CA"/>
+          </a:p>
+        </p:txBody>
+      </p:sp>
+      <p:sp>
+        <p:nvSpPr>
+          <p:cNvPr id="3" name="Espace réservé du contenu 2">
+            <a:extLst>
+              <a:ext uri="{FF2B5EF4-FFF2-40B4-BE49-F238E27FC236}">
+                <a16:creationId xmlns:a16="http://schemas.microsoft.com/office/drawing/2014/main" id="{210A75BE-3715-4E20-A750-F97C21DCCD59}"/>
+              </a:ext>
+            </a:extLst>
+          </p:cNvPr>
+          <p:cNvSpPr>
+            <a:spLocks noGrp="1"/>
+          </p:cNvSpPr>
+          <p:nvPr>
+            <p:ph idx="1"/>
+          </p:nvPr>
+        </p:nvSpPr>
+        <p:spPr/>
+        <p:txBody>
+          <a:bodyPr/>
+          <a:lstStyle/>
+          <a:p>
+            <a:endParaRPr lang="fr-CA"/>
+          </a:p>
+        </p:txBody>
+      </p:sp>
+      <p:pic>
+        <p:nvPicPr>
+          <p:cNvPr id="4" name="Image 3">
+            <a:extLst>
+              <a:ext uri="{FF2B5EF4-FFF2-40B4-BE49-F238E27FC236}">
+                <a16:creationId xmlns:a16="http://schemas.microsoft.com/office/drawing/2014/main" id="{B53FAD39-A85E-408D-80C6-8414AF91A45D}"/>
+              </a:ext>
+            </a:extLst>
+          </p:cNvPr>
+          <p:cNvPicPr>
+            <a:picLocks noChangeAspect="1"/>
+          </p:cNvPicPr>
+          <p:nvPr/>
+        </p:nvPicPr>
+        <p:blipFill>
+          <a:blip r:embed="rId2"/>
+          <a:stretch>
+            <a:fillRect/>
+          </a:stretch>
+        </p:blipFill>
+        <p:spPr>
+          <a:xfrm>
+            <a:off x="0" y="857250"/>
+            <a:ext cx="12192000" cy="5143500"/>
+          </a:xfrm>
+          <a:prstGeom prst="rect">
+            <a:avLst/>
+          </a:prstGeom>
+          <a:ln>
+            <a:solidFill>
+              <a:schemeClr val="bg1">
+                <a:lumMod val="50000"/>
+              </a:schemeClr>
+            </a:solidFill>
+          </a:ln>
+        </p:spPr>
+      </p:pic>
+    </p:spTree>
+    <p:extLst>
+      <p:ext uri="{BB962C8B-B14F-4D97-AF65-F5344CB8AC3E}">
+        <p14:creationId xmlns:p14="http://schemas.microsoft.com/office/powerpoint/2010/main" val="1912450822"/>
+      </p:ext>
+    </p:extLst>
+  </p:cSld>
+  <p:clrMapOvr>
+    <a:masterClrMapping/>
+  </p:clrMapOvr>
+</p:sld>
+</file>
+
+<file path=ppt/slides/slide13.xml><?xml version="1.0" encoding="utf-8"?>
+<p:sld xmlns:a="http://schemas.openxmlformats.org/drawingml/2006/main" xmlns:r="http://schemas.openxmlformats.org/officeDocument/2006/relationships" xmlns:p="http://schemas.openxmlformats.org/presentationml/2006/main">
+  <p:cSld>
+    <p:spTree>
+      <p:nvGrpSpPr>
+        <p:cNvPr id="1" name=""/>
+        <p:cNvGrpSpPr/>
+        <p:nvPr/>
+      </p:nvGrpSpPr>
+      <p:grpSpPr>
+        <a:xfrm>
+          <a:off x="0" y="0"/>
+          <a:ext cx="0" cy="0"/>
+          <a:chOff x="0" y="0"/>
+          <a:chExt cx="0" cy="0"/>
+        </a:xfrm>
+      </p:grpSpPr>
+      <p:sp>
+        <p:nvSpPr>
+          <p:cNvPr id="2" name="Titre 1">
+            <a:extLst>
+              <a:ext uri="{FF2B5EF4-FFF2-40B4-BE49-F238E27FC236}">
+                <a16:creationId xmlns:a16="http://schemas.microsoft.com/office/drawing/2014/main" id="{7ACD089C-EE3B-47D9-9E28-BB066EA49ED0}"/>
+              </a:ext>
+            </a:extLst>
+          </p:cNvPr>
+          <p:cNvSpPr>
+            <a:spLocks noGrp="1"/>
+          </p:cNvSpPr>
+          <p:nvPr>
+            <p:ph type="title"/>
+          </p:nvPr>
+        </p:nvSpPr>
+        <p:spPr/>
+        <p:txBody>
+          <a:bodyPr/>
+          <a:lstStyle/>
+          <a:p>
+            <a:endParaRPr lang="fr-CA"/>
+          </a:p>
+        </p:txBody>
+      </p:sp>
+      <p:sp>
+        <p:nvSpPr>
+          <p:cNvPr id="3" name="Espace réservé du contenu 2">
+            <a:extLst>
+              <a:ext uri="{FF2B5EF4-FFF2-40B4-BE49-F238E27FC236}">
+                <a16:creationId xmlns:a16="http://schemas.microsoft.com/office/drawing/2014/main" id="{9879DC39-3773-4B7E-AF92-B76428804ECE}"/>
+              </a:ext>
+            </a:extLst>
+          </p:cNvPr>
+          <p:cNvSpPr>
+            <a:spLocks noGrp="1"/>
+          </p:cNvSpPr>
+          <p:nvPr>
+            <p:ph idx="1"/>
+          </p:nvPr>
+        </p:nvSpPr>
+        <p:spPr/>
+        <p:txBody>
+          <a:bodyPr/>
+          <a:lstStyle/>
+          <a:p>
+            <a:endParaRPr lang="fr-CA"/>
+          </a:p>
+        </p:txBody>
+      </p:sp>
+      <p:pic>
+        <p:nvPicPr>
+          <p:cNvPr id="4" name="Image 3">
+            <a:extLst>
+              <a:ext uri="{FF2B5EF4-FFF2-40B4-BE49-F238E27FC236}">
+                <a16:creationId xmlns:a16="http://schemas.microsoft.com/office/drawing/2014/main" id="{4D632ABD-FEDA-4DA2-9E8D-D68AE4167E5A}"/>
+              </a:ext>
+            </a:extLst>
+          </p:cNvPr>
+          <p:cNvPicPr>
+            <a:picLocks noChangeAspect="1"/>
+          </p:cNvPicPr>
+          <p:nvPr/>
+        </p:nvPicPr>
+        <p:blipFill>
+          <a:blip r:embed="rId2"/>
+          <a:stretch>
+            <a:fillRect/>
+          </a:stretch>
+        </p:blipFill>
+        <p:spPr>
+          <a:xfrm>
+            <a:off x="0" y="857250"/>
+            <a:ext cx="12192000" cy="5143500"/>
+          </a:xfrm>
+          <a:prstGeom prst="rect">
+            <a:avLst/>
+          </a:prstGeom>
+          <a:ln>
+            <a:solidFill>
+              <a:schemeClr val="bg1">
+                <a:lumMod val="50000"/>
+              </a:schemeClr>
+            </a:solidFill>
+          </a:ln>
+        </p:spPr>
+      </p:pic>
+    </p:spTree>
+    <p:extLst>
+      <p:ext uri="{BB962C8B-B14F-4D97-AF65-F5344CB8AC3E}">
+        <p14:creationId xmlns:p14="http://schemas.microsoft.com/office/powerpoint/2010/main" val="2992135697"/>
       </p:ext>
     </p:extLst>
   </p:cSld>
@@ -5216,18 +5493,18 @@
 </file>
 
 <file path=customXml/item2.xml><?xml version="1.0" encoding="utf-8"?>
+<p:properties xmlns:p="http://schemas.microsoft.com/office/2006/metadata/properties" xmlns:xsi="http://www.w3.org/2001/XMLSchema-instance" xmlns:pc="http://schemas.microsoft.com/office/infopath/2007/PartnerControls">
+  <documentManagement/>
+</p:properties>
+</file>
+
+<file path=customXml/item3.xml><?xml version="1.0" encoding="utf-8"?>
 <?mso-contentType ?>
 <FormTemplates xmlns="http://schemas.microsoft.com/sharepoint/v3/contenttype/forms">
   <Display>DocumentLibraryForm</Display>
   <Edit>DocumentLibraryForm</Edit>
   <New>DocumentLibraryForm</New>
 </FormTemplates>
-</file>
-
-<file path=customXml/item3.xml><?xml version="1.0" encoding="utf-8"?>
-<p:properties xmlns:p="http://schemas.microsoft.com/office/2006/metadata/properties" xmlns:xsi="http://www.w3.org/2001/XMLSchema-instance" xmlns:pc="http://schemas.microsoft.com/office/infopath/2007/PartnerControls">
-  <documentManagement/>
-</p:properties>
 </file>
 
 <file path=customXml/itemProps1.xml><?xml version="1.0" encoding="utf-8"?>
@@ -5250,26 +5527,26 @@
 </file>
 
 <file path=customXml/itemProps2.xml><?xml version="1.0" encoding="utf-8"?>
+<ds:datastoreItem xmlns:ds="http://schemas.openxmlformats.org/officeDocument/2006/customXml" ds:itemID="{F95B8AFA-4EC7-4E42-87A1-D50FA71FA815}">
+  <ds:schemaRefs>
+    <ds:schemaRef ds:uri="http://purl.org/dc/terms/"/>
+    <ds:schemaRef ds:uri="http://schemas.openxmlformats.org/package/2006/metadata/core-properties"/>
+    <ds:schemaRef ds:uri="http://schemas.microsoft.com/office/2006/documentManagement/types"/>
+    <ds:schemaRef ds:uri="http://purl.org/dc/elements/1.1/"/>
+    <ds:schemaRef ds:uri="http://purl.org/dc/dcmitype/"/>
+    <ds:schemaRef ds:uri="http://www.w3.org/XML/1998/namespace"/>
+    <ds:schemaRef ds:uri="0521128b-fa6f-4216-a311-c6ddee8c8316"/>
+    <ds:schemaRef ds:uri="http://schemas.microsoft.com/office/infopath/2007/PartnerControls"/>
+    <ds:schemaRef ds:uri="52e651b7-b90a-4e20-8373-f1ed72147340"/>
+    <ds:schemaRef ds:uri="http://schemas.microsoft.com/office/2006/metadata/properties"/>
+  </ds:schemaRefs>
+</ds:datastoreItem>
+</file>
+
+<file path=customXml/itemProps3.xml><?xml version="1.0" encoding="utf-8"?>
 <ds:datastoreItem xmlns:ds="http://schemas.openxmlformats.org/officeDocument/2006/customXml" ds:itemID="{AA207391-5859-40C8-B675-7EEB2B478E80}">
   <ds:schemaRefs>
     <ds:schemaRef ds:uri="http://schemas.microsoft.com/sharepoint/v3/contenttype/forms"/>
   </ds:schemaRefs>
 </ds:datastoreItem>
-</file>
-
-<file path=customXml/itemProps3.xml><?xml version="1.0" encoding="utf-8"?>
-<ds:datastoreItem xmlns:ds="http://schemas.openxmlformats.org/officeDocument/2006/customXml" ds:itemID="{F95B8AFA-4EC7-4E42-87A1-D50FA71FA815}">
-  <ds:schemaRefs>
-    <ds:schemaRef ds:uri="http://schemas.microsoft.com/office/2006/metadata/properties"/>
-    <ds:schemaRef ds:uri="http://purl.org/dc/dcmitype/"/>
-    <ds:schemaRef ds:uri="http://schemas.microsoft.com/office/infopath/2007/PartnerControls"/>
-    <ds:schemaRef ds:uri="52e651b7-b90a-4e20-8373-f1ed72147340"/>
-    <ds:schemaRef ds:uri="http://purl.org/dc/elements/1.1/"/>
-    <ds:schemaRef ds:uri="0521128b-fa6f-4216-a311-c6ddee8c8316"/>
-    <ds:schemaRef ds:uri="http://www.w3.org/XML/1998/namespace"/>
-    <ds:schemaRef ds:uri="http://schemas.microsoft.com/office/2006/documentManagement/types"/>
-    <ds:schemaRef ds:uri="http://purl.org/dc/terms/"/>
-    <ds:schemaRef ds:uri="http://schemas.openxmlformats.org/package/2006/metadata/core-properties"/>
-  </ds:schemaRefs>
-</ds:datastoreItem>
 </file>
</xml_diff>